<commit_message>
creating a real readme and adding assignment
</commit_message>
<xml_diff>
--- a/01 - Introduction.pptx
+++ b/01 - Introduction.pptx
@@ -5,7 +5,7 @@
     <p:sldMasterId id="2147483648" r:id="rId1"/>
   </p:sldMasterIdLst>
   <p:notesMasterIdLst>
-    <p:notesMasterId r:id="rId32"/>
+    <p:notesMasterId r:id="rId33"/>
   </p:notesMasterIdLst>
   <p:sldIdLst>
     <p:sldId id="313" r:id="rId2"/>
@@ -38,6 +38,7 @@
     <p:sldId id="280" r:id="rId29"/>
     <p:sldId id="281" r:id="rId30"/>
     <p:sldId id="282" r:id="rId31"/>
+    <p:sldId id="317" r:id="rId32"/>
   </p:sldIdLst>
   <p:sldSz cx="12192000" cy="6858000"/>
   <p:notesSz cx="6858000" cy="9144000"/>
@@ -624,6 +625,191 @@
           <a:bodyPr/>
           <a:lstStyle/>
           <a:p>
+            <a:r>
+              <a:rPr lang="en-US" sz="1200" b="0" i="0" kern="1200" dirty="0">
+                <a:solidFill>
+                  <a:schemeClr val="tx1"/>
+                </a:solidFill>
+                <a:effectLst/>
+                <a:latin typeface="+mn-lt"/>
+                <a:ea typeface="+mn-ea"/>
+                <a:cs typeface="+mn-cs"/>
+              </a:rPr>
+              <a:t>REST is defined by four interface constraints: identification of resources; manipulation of resources through representations; self-descriptive messages; and, hypermedia as the engine of application state.</a:t>
+            </a:r>
+          </a:p>
+          <a:p>
+            <a:endParaRPr lang="en-US" sz="1200" b="0" i="0" kern="1200" dirty="0">
+              <a:solidFill>
+                <a:schemeClr val="tx1"/>
+              </a:solidFill>
+              <a:effectLst/>
+              <a:latin typeface="+mn-lt"/>
+              <a:ea typeface="+mn-ea"/>
+              <a:cs typeface="+mn-cs"/>
+            </a:endParaRPr>
+          </a:p>
+          <a:p>
+            <a:r>
+              <a:rPr lang="en-US" sz="1200" b="0" i="0" kern="1200" dirty="0">
+                <a:solidFill>
+                  <a:schemeClr val="tx1"/>
+                </a:solidFill>
+                <a:effectLst/>
+                <a:latin typeface="+mn-lt"/>
+                <a:ea typeface="+mn-ea"/>
+                <a:cs typeface="+mn-cs"/>
+              </a:rPr>
+              <a:t>The key abstraction of information in REST is a resource. Any information that can be named can be a resource: a document or image, a temporal service (e.g. "today's weather in Los Angeles"), a collection of other resources, a non-virtual object (e.g. a person), and so on. In other words, any concept that might be the target of an author's hypertext reference must fit within the definition of a resource. A resource is a conceptual mapping to a set of entities, not the entity that corresponds to the mapping at any particular point in time.</a:t>
+            </a:r>
+          </a:p>
+          <a:p>
+            <a:endParaRPr lang="en-US" sz="1200" b="0" i="0" kern="1200" dirty="0">
+              <a:solidFill>
+                <a:schemeClr val="tx1"/>
+              </a:solidFill>
+              <a:effectLst/>
+              <a:latin typeface="+mn-lt"/>
+              <a:ea typeface="+mn-ea"/>
+              <a:cs typeface="+mn-cs"/>
+            </a:endParaRPr>
+          </a:p>
+          <a:p>
+            <a:pPr fontAlgn="base"/>
+            <a:r>
+              <a:rPr lang="en-US" sz="1200" b="0" i="0" kern="1200" dirty="0">
+                <a:solidFill>
+                  <a:schemeClr val="tx1"/>
+                </a:solidFill>
+                <a:effectLst/>
+                <a:latin typeface="+mn-lt"/>
+                <a:ea typeface="+mn-ea"/>
+                <a:cs typeface="+mn-cs"/>
+              </a:rPr>
+              <a:t>REST components perform actions on a resource by using a representation to capture the current or intended state of that resource and transferring that representation between components. A representation is a sequence of bytes, plus representation metadata to describe those bytes. Other commonly used but less precise names for a representation include: document, file, and HTTP message entity, instance, or variant.</a:t>
+            </a:r>
+          </a:p>
+          <a:p>
+            <a:pPr fontAlgn="base"/>
+            <a:endParaRPr lang="en-US" sz="1200" b="0" i="0" kern="1200" dirty="0">
+              <a:solidFill>
+                <a:schemeClr val="tx1"/>
+              </a:solidFill>
+              <a:effectLst/>
+              <a:latin typeface="+mn-lt"/>
+              <a:ea typeface="+mn-ea"/>
+              <a:cs typeface="+mn-cs"/>
+            </a:endParaRPr>
+          </a:p>
+          <a:p>
+            <a:pPr fontAlgn="base"/>
+            <a:r>
+              <a:rPr lang="en-US" sz="1200" b="0" i="0" kern="1200" dirty="0">
+                <a:solidFill>
+                  <a:schemeClr val="tx1"/>
+                </a:solidFill>
+                <a:effectLst/>
+                <a:latin typeface="+mn-lt"/>
+                <a:ea typeface="+mn-ea"/>
+                <a:cs typeface="+mn-cs"/>
+              </a:rPr>
+              <a:t>A representation consists of data, metadata describing the data, and, on occasion, metadata to describe the metadata (usually for the purpose of verifying message integrity).</a:t>
+            </a:r>
+          </a:p>
+          <a:p>
+            <a:endParaRPr lang="en-US" dirty="0"/>
+          </a:p>
+          <a:p>
+            <a:r>
+              <a:rPr lang="en-US" dirty="0"/>
+              <a:t>An example of a resource is “Today’s weather in Seattle”. The representation would be the combination of bits that make up the thing delivered over the wire to the caller. This might be JSON, XML, text, or some other predetermined format.</a:t>
+            </a:r>
+          </a:p>
+          <a:p>
+            <a:endParaRPr lang="en-US" dirty="0"/>
+          </a:p>
+        </p:txBody>
+      </p:sp>
+      <p:sp>
+        <p:nvSpPr>
+          <p:cNvPr id="4" name="Slide Number Placeholder 3"/>
+          <p:cNvSpPr>
+            <a:spLocks noGrp="1"/>
+          </p:cNvSpPr>
+          <p:nvPr>
+            <p:ph type="sldNum" sz="quarter" idx="10"/>
+          </p:nvPr>
+        </p:nvSpPr>
+        <p:spPr/>
+        <p:txBody>
+          <a:bodyPr/>
+          <a:lstStyle/>
+          <a:p>
+            <a:fld id="{E58294B0-43FA-4697-A94A-C7D8A3CEE26B}" type="slidenum">
+              <a:rPr lang="en-US" smtClean="0"/>
+              <a:t>10</a:t>
+            </a:fld>
+            <a:endParaRPr lang="en-US"/>
+          </a:p>
+        </p:txBody>
+      </p:sp>
+    </p:spTree>
+    <p:extLst>
+      <p:ext uri="{BB962C8B-B14F-4D97-AF65-F5344CB8AC3E}">
+        <p14:creationId xmlns:p14="http://schemas.microsoft.com/office/powerpoint/2010/main" val="4158182312"/>
+      </p:ext>
+    </p:extLst>
+  </p:cSld>
+  <p:clrMapOvr>
+    <a:masterClrMapping/>
+  </p:clrMapOvr>
+</p:notes>
+</file>
+
+<file path=ppt/notesSlides/notesSlide3.xml><?xml version="1.0" encoding="utf-8"?>
+<p:notes xmlns:a="http://schemas.openxmlformats.org/drawingml/2006/main" xmlns:r="http://schemas.openxmlformats.org/officeDocument/2006/relationships" xmlns:p="http://schemas.openxmlformats.org/presentationml/2006/main">
+  <p:cSld>
+    <p:spTree>
+      <p:nvGrpSpPr>
+        <p:cNvPr id="1" name=""/>
+        <p:cNvGrpSpPr/>
+        <p:nvPr/>
+      </p:nvGrpSpPr>
+      <p:grpSpPr>
+        <a:xfrm>
+          <a:off x="0" y="0"/>
+          <a:ext cx="0" cy="0"/>
+          <a:chOff x="0" y="0"/>
+          <a:chExt cx="0" cy="0"/>
+        </a:xfrm>
+      </p:grpSpPr>
+      <p:sp>
+        <p:nvSpPr>
+          <p:cNvPr id="2" name="Slide Image Placeholder 1"/>
+          <p:cNvSpPr>
+            <a:spLocks noGrp="1" noRot="1" noChangeAspect="1"/>
+          </p:cNvSpPr>
+          <p:nvPr>
+            <p:ph type="sldImg"/>
+          </p:nvPr>
+        </p:nvSpPr>
+        <p:spPr/>
+      </p:sp>
+      <p:sp>
+        <p:nvSpPr>
+          <p:cNvPr id="3" name="Notes Placeholder 2"/>
+          <p:cNvSpPr>
+            <a:spLocks noGrp="1"/>
+          </p:cNvSpPr>
+          <p:nvPr>
+            <p:ph type="body" idx="1"/>
+          </p:nvPr>
+        </p:nvSpPr>
+        <p:spPr/>
+        <p:txBody>
+          <a:bodyPr/>
+          <a:lstStyle/>
+          <a:p>
             <a:pPr marL="171450" indent="-171450">
               <a:buFont typeface="Arial" panose="020B0604020202020204" pitchFamily="34" charset="0"/>
               <a:buChar char="•"/>
@@ -759,7 +945,290 @@
 </p:notes>
 </file>
 
-<file path=ppt/notesSlides/notesSlide3.xml><?xml version="1.0" encoding="utf-8"?>
+<file path=ppt/notesSlides/notesSlide4.xml><?xml version="1.0" encoding="utf-8"?>
+<p:notes xmlns:a="http://schemas.openxmlformats.org/drawingml/2006/main" xmlns:r="http://schemas.openxmlformats.org/officeDocument/2006/relationships" xmlns:p="http://schemas.openxmlformats.org/presentationml/2006/main">
+  <p:cSld>
+    <p:spTree>
+      <p:nvGrpSpPr>
+        <p:cNvPr id="1" name=""/>
+        <p:cNvGrpSpPr/>
+        <p:nvPr/>
+      </p:nvGrpSpPr>
+      <p:grpSpPr>
+        <a:xfrm>
+          <a:off x="0" y="0"/>
+          <a:ext cx="0" cy="0"/>
+          <a:chOff x="0" y="0"/>
+          <a:chExt cx="0" cy="0"/>
+        </a:xfrm>
+      </p:grpSpPr>
+      <p:sp>
+        <p:nvSpPr>
+          <p:cNvPr id="2" name="Slide Image Placeholder 1"/>
+          <p:cNvSpPr>
+            <a:spLocks noGrp="1" noRot="1" noChangeAspect="1"/>
+          </p:cNvSpPr>
+          <p:nvPr>
+            <p:ph type="sldImg"/>
+          </p:nvPr>
+        </p:nvSpPr>
+        <p:spPr/>
+      </p:sp>
+      <p:sp>
+        <p:nvSpPr>
+          <p:cNvPr id="3" name="Notes Placeholder 2"/>
+          <p:cNvSpPr>
+            <a:spLocks noGrp="1"/>
+          </p:cNvSpPr>
+          <p:nvPr>
+            <p:ph type="body" idx="1"/>
+          </p:nvPr>
+        </p:nvSpPr>
+        <p:spPr/>
+        <p:txBody>
+          <a:bodyPr/>
+          <a:lstStyle/>
+          <a:p>
+            <a:r>
+              <a:rPr lang="en-US" dirty="0"/>
+              <a:t>Stolen from </a:t>
+            </a:r>
+            <a:r>
+              <a:rPr lang="en-US" dirty="0" err="1"/>
+              <a:t>StackOverflow</a:t>
+            </a:r>
+            <a:r>
+              <a:rPr lang="en-US" dirty="0"/>
+              <a:t> (https://</a:t>
+            </a:r>
+            <a:r>
+              <a:rPr lang="en-US" dirty="0" err="1"/>
+              <a:t>stackoverflow.com</a:t>
+            </a:r>
+            <a:r>
+              <a:rPr lang="en-US" dirty="0"/>
+              <a:t>/a/26049761)</a:t>
+            </a:r>
+          </a:p>
+          <a:p>
+            <a:endParaRPr lang="en-US" dirty="0"/>
+          </a:p>
+          <a:p>
+            <a:pPr fontAlgn="base"/>
+            <a:r>
+              <a:rPr lang="en-US" sz="1200" b="1" i="0" kern="1200" dirty="0">
+                <a:solidFill>
+                  <a:schemeClr val="tx1"/>
+                </a:solidFill>
+                <a:effectLst/>
+                <a:latin typeface="+mn-lt"/>
+                <a:ea typeface="+mn-ea"/>
+                <a:cs typeface="+mn-cs"/>
+              </a:rPr>
+              <a:t>Identification of resources </a:t>
+            </a:r>
+            <a:r>
+              <a:rPr lang="en-US" sz="1200" b="0" i="0" kern="1200" dirty="0">
+                <a:solidFill>
+                  <a:schemeClr val="tx1"/>
+                </a:solidFill>
+                <a:effectLst/>
+                <a:latin typeface="+mn-lt"/>
+                <a:ea typeface="+mn-ea"/>
+                <a:cs typeface="+mn-cs"/>
+              </a:rPr>
+              <a:t>- You use the URI (IRI) standard to identify a resource. In this case a resource is a web document.</a:t>
+            </a:r>
+          </a:p>
+          <a:p>
+            <a:pPr fontAlgn="base"/>
+            <a:r>
+              <a:rPr lang="en-US" sz="1200" b="1" i="0" kern="1200" dirty="0">
+                <a:solidFill>
+                  <a:schemeClr val="tx1"/>
+                </a:solidFill>
+                <a:effectLst/>
+                <a:latin typeface="+mn-lt"/>
+                <a:ea typeface="+mn-ea"/>
+                <a:cs typeface="+mn-cs"/>
+              </a:rPr>
+              <a:t>Manipulation of resources through these representations </a:t>
+            </a:r>
+            <a:r>
+              <a:rPr lang="en-US" sz="1200" b="0" i="0" kern="1200" dirty="0">
+                <a:solidFill>
+                  <a:schemeClr val="tx1"/>
+                </a:solidFill>
+                <a:effectLst/>
+                <a:latin typeface="+mn-lt"/>
+                <a:ea typeface="+mn-ea"/>
+                <a:cs typeface="+mn-cs"/>
+              </a:rPr>
+              <a:t>- You use the HTTP standard to describe communication. So for example GET means that you want to retrieve data about the URI identified resource. You can describe an operation with a HTTP method and an URI.</a:t>
+            </a:r>
+          </a:p>
+          <a:p>
+            <a:pPr fontAlgn="base"/>
+            <a:r>
+              <a:rPr lang="en-US" sz="1200" b="1" i="0" kern="1200" dirty="0">
+                <a:solidFill>
+                  <a:schemeClr val="tx1"/>
+                </a:solidFill>
+                <a:effectLst/>
+                <a:latin typeface="+mn-lt"/>
+                <a:ea typeface="+mn-ea"/>
+                <a:cs typeface="+mn-cs"/>
+              </a:rPr>
+              <a:t>Self-descriptive messages </a:t>
+            </a:r>
+            <a:r>
+              <a:rPr lang="en-US" sz="1200" b="0" i="0" kern="1200" dirty="0">
+                <a:solidFill>
+                  <a:schemeClr val="tx1"/>
+                </a:solidFill>
+                <a:effectLst/>
+                <a:latin typeface="+mn-lt"/>
+                <a:ea typeface="+mn-ea"/>
+                <a:cs typeface="+mn-cs"/>
+              </a:rPr>
+              <a:t>- You use standard MIME types and (standard) RDF vocabs to make messages self-descriptive. So the client can find the data by checking the semantics, and it don't have to know the application specific data structure the service uses.</a:t>
+            </a:r>
+          </a:p>
+          <a:p>
+            <a:pPr fontAlgn="base"/>
+            <a:r>
+              <a:rPr lang="en-US" sz="1200" b="1" i="0" kern="1200" dirty="0">
+                <a:solidFill>
+                  <a:schemeClr val="tx1"/>
+                </a:solidFill>
+                <a:effectLst/>
+                <a:latin typeface="+mn-lt"/>
+                <a:ea typeface="+mn-ea"/>
+                <a:cs typeface="+mn-cs"/>
+              </a:rPr>
+              <a:t>Hypermedia as the engine of application state (A.K.A. HATEOAS)</a:t>
+            </a:r>
+            <a:r>
+              <a:rPr lang="en-US" sz="1200" b="0" i="0" kern="1200" dirty="0">
+                <a:solidFill>
+                  <a:schemeClr val="tx1"/>
+                </a:solidFill>
+                <a:effectLst/>
+                <a:latin typeface="+mn-lt"/>
+                <a:ea typeface="+mn-ea"/>
+                <a:cs typeface="+mn-cs"/>
+              </a:rPr>
+              <a:t> - You use hyperlinks and possibly URI templates to decouple the client from the application specific URI structure. You can annotate these hyperlinks with semantics e.g. IANA link relations, so the client will understand what they mean.</a:t>
+            </a:r>
+          </a:p>
+          <a:p>
+            <a:endParaRPr lang="en-US" dirty="0"/>
+          </a:p>
+          <a:p>
+            <a:r>
+              <a:rPr lang="en-US" dirty="0"/>
+              <a:t>HTTP verbs and their commonly agreed upon semantics</a:t>
+            </a:r>
+          </a:p>
+          <a:p>
+            <a:endParaRPr lang="en-US" dirty="0"/>
+          </a:p>
+          <a:p>
+            <a:pPr marL="171450" indent="-171450">
+              <a:buFont typeface="Arial" panose="020B0604020202020204" pitchFamily="34" charset="0"/>
+              <a:buChar char="•"/>
+            </a:pPr>
+            <a:r>
+              <a:rPr lang="en-US" dirty="0"/>
+              <a:t>GET – retrieve a representation for a given resource</a:t>
+            </a:r>
+          </a:p>
+          <a:p>
+            <a:pPr marL="171450" indent="-171450">
+              <a:buFont typeface="Arial" panose="020B0604020202020204" pitchFamily="34" charset="0"/>
+              <a:buChar char="•"/>
+            </a:pPr>
+            <a:r>
+              <a:rPr lang="en-US" dirty="0"/>
+              <a:t>POST – create a resource given a representation</a:t>
+            </a:r>
+          </a:p>
+          <a:p>
+            <a:pPr marL="171450" indent="-171450">
+              <a:buFont typeface="Arial" panose="020B0604020202020204" pitchFamily="34" charset="0"/>
+              <a:buChar char="•"/>
+            </a:pPr>
+            <a:r>
+              <a:rPr lang="en-US" dirty="0"/>
+              <a:t>PUT – replace a resource given a representation</a:t>
+            </a:r>
+          </a:p>
+          <a:p>
+            <a:pPr marL="171450" indent="-171450">
+              <a:buFont typeface="Arial" panose="020B0604020202020204" pitchFamily="34" charset="0"/>
+              <a:buChar char="•"/>
+            </a:pPr>
+            <a:r>
+              <a:rPr lang="en-US" dirty="0"/>
+              <a:t>PATCH – update, partially, a resource from a given representation (this one is tough because it requires the representation to include metadata that wouldn’t otherwise be part of the representation)</a:t>
+            </a:r>
+          </a:p>
+          <a:p>
+            <a:pPr marL="171450" indent="-171450">
+              <a:buFont typeface="Arial" panose="020B0604020202020204" pitchFamily="34" charset="0"/>
+              <a:buChar char="•"/>
+            </a:pPr>
+            <a:r>
+              <a:rPr lang="en-US" dirty="0"/>
+              <a:t>DELETE – remove a resource (but is sometimes used to play the role of a CLOSE or TERMINATE verb if that makes sense for the resource)</a:t>
+            </a:r>
+          </a:p>
+          <a:p>
+            <a:pPr marL="171450" indent="-171450">
+              <a:buFont typeface="Arial" panose="020B0604020202020204" pitchFamily="34" charset="0"/>
+              <a:buChar char="•"/>
+            </a:pPr>
+            <a:endParaRPr lang="en-US" dirty="0"/>
+          </a:p>
+        </p:txBody>
+      </p:sp>
+      <p:sp>
+        <p:nvSpPr>
+          <p:cNvPr id="4" name="Slide Number Placeholder 3"/>
+          <p:cNvSpPr>
+            <a:spLocks noGrp="1"/>
+          </p:cNvSpPr>
+          <p:nvPr>
+            <p:ph type="sldNum" sz="quarter" idx="10"/>
+          </p:nvPr>
+        </p:nvSpPr>
+        <p:spPr/>
+        <p:txBody>
+          <a:bodyPr/>
+          <a:lstStyle/>
+          <a:p>
+            <a:fld id="{E58294B0-43FA-4697-A94A-C7D8A3CEE26B}" type="slidenum">
+              <a:rPr lang="en-US" smtClean="0"/>
+              <a:t>12</a:t>
+            </a:fld>
+            <a:endParaRPr lang="en-US"/>
+          </a:p>
+        </p:txBody>
+      </p:sp>
+    </p:spTree>
+    <p:extLst>
+      <p:ext uri="{BB962C8B-B14F-4D97-AF65-F5344CB8AC3E}">
+        <p14:creationId xmlns:p14="http://schemas.microsoft.com/office/powerpoint/2010/main" val="3247398875"/>
+      </p:ext>
+    </p:extLst>
+  </p:cSld>
+  <p:clrMapOvr>
+    <a:masterClrMapping/>
+  </p:clrMapOvr>
+</p:notes>
+</file>
+
+<file path=ppt/notesSlides/notesSlide5.xml><?xml version="1.0" encoding="utf-8"?>
 <p:notes xmlns:a="http://schemas.openxmlformats.org/drawingml/2006/main" xmlns:r="http://schemas.openxmlformats.org/officeDocument/2006/relationships" xmlns:p="http://schemas.openxmlformats.org/presentationml/2006/main">
   <p:cSld>
     <p:spTree>
@@ -3834,7 +4303,7 @@
             </a:pPr>
             <a:r>
               <a:rPr lang="en-US" sz="2000" dirty="0">
-                <a:hlinkClick r:id="rId2"/>
+                <a:hlinkClick r:id="rId3"/>
               </a:rPr>
               <a:t>http://www.ics.uci.edu/~fielding/pubs/dissertation/top.htm</a:t>
             </a:r>
@@ -4044,7 +4513,7 @@
           <a:p>
             <a:r>
               <a:rPr lang="en-US" dirty="0"/>
-              <a:t>Formal REST constraints</a:t>
+              <a:t>Deriving REST as an architectural style</a:t>
             </a:r>
           </a:p>
         </p:txBody>
@@ -4069,6 +4538,15 @@
             </a:pPr>
             <a:r>
               <a:rPr lang="en-US" dirty="0"/>
+              <a:t>Start with the NULL style</a:t>
+            </a:r>
+          </a:p>
+          <a:p>
+            <a:pPr marL="0" indent="0">
+              <a:buNone/>
+            </a:pPr>
+            <a:r>
+              <a:rPr lang="en-US" dirty="0"/>
               <a:t>Client-server</a:t>
             </a:r>
           </a:p>
@@ -4105,7 +4583,7 @@
             </a:pPr>
             <a:r>
               <a:rPr lang="en-US" dirty="0"/>
-              <a:t>(Code on demand)</a:t>
+              <a:t>Uniform interface</a:t>
             </a:r>
           </a:p>
           <a:p>
@@ -4114,14 +4592,8 @@
             </a:pPr>
             <a:r>
               <a:rPr lang="en-US" dirty="0"/>
-              <a:t>Uniform interface</a:t>
-            </a:r>
-          </a:p>
-          <a:p>
-            <a:pPr marL="0" indent="0">
-              <a:buNone/>
-            </a:pPr>
-            <a:endParaRPr lang="en-US" dirty="0"/>
+              <a:t>Code on demand</a:t>
+            </a:r>
           </a:p>
         </p:txBody>
       </p:sp>
@@ -11530,7 +12002,7 @@
           <a:p>
             <a:r>
               <a:rPr lang="en-US" dirty="0"/>
-              <a:t>For next week</a:t>
+              <a:t>For next week - reading</a:t>
             </a:r>
           </a:p>
         </p:txBody>
@@ -11699,6 +12171,166 @@
     <p:extLst>
       <p:ext uri="{BB962C8B-B14F-4D97-AF65-F5344CB8AC3E}">
         <p14:creationId xmlns:p14="http://schemas.microsoft.com/office/powerpoint/2010/main" val="3379872475"/>
+      </p:ext>
+    </p:extLst>
+  </p:cSld>
+  <p:clrMapOvr>
+    <a:masterClrMapping/>
+  </p:clrMapOvr>
+</p:sld>
+</file>
+
+<file path=ppt/slides/slide31.xml><?xml version="1.0" encoding="utf-8"?>
+<p:sld xmlns:a="http://schemas.openxmlformats.org/drawingml/2006/main" xmlns:r="http://schemas.openxmlformats.org/officeDocument/2006/relationships" xmlns:p="http://schemas.openxmlformats.org/presentationml/2006/main">
+  <p:cSld>
+    <p:spTree>
+      <p:nvGrpSpPr>
+        <p:cNvPr id="1" name=""/>
+        <p:cNvGrpSpPr/>
+        <p:nvPr/>
+      </p:nvGrpSpPr>
+      <p:grpSpPr>
+        <a:xfrm>
+          <a:off x="0" y="0"/>
+          <a:ext cx="0" cy="0"/>
+          <a:chOff x="0" y="0"/>
+          <a:chExt cx="0" cy="0"/>
+        </a:xfrm>
+      </p:grpSpPr>
+      <p:sp>
+        <p:nvSpPr>
+          <p:cNvPr id="2" name="Title 1">
+            <a:extLst>
+              <a:ext uri="{FF2B5EF4-FFF2-40B4-BE49-F238E27FC236}">
+                <a16:creationId xmlns:a16="http://schemas.microsoft.com/office/drawing/2014/main" id="{50D345BF-0EF4-A846-8170-F3E14F822504}"/>
+              </a:ext>
+            </a:extLst>
+          </p:cNvPr>
+          <p:cNvSpPr>
+            <a:spLocks noGrp="1"/>
+          </p:cNvSpPr>
+          <p:nvPr>
+            <p:ph type="title"/>
+          </p:nvPr>
+        </p:nvSpPr>
+        <p:spPr/>
+        <p:txBody>
+          <a:bodyPr/>
+          <a:lstStyle/>
+          <a:p>
+            <a:r>
+              <a:rPr lang="en-US" dirty="0"/>
+              <a:t>For next week - homework</a:t>
+            </a:r>
+          </a:p>
+        </p:txBody>
+      </p:sp>
+      <p:sp>
+        <p:nvSpPr>
+          <p:cNvPr id="3" name="Content Placeholder 2">
+            <a:extLst>
+              <a:ext uri="{FF2B5EF4-FFF2-40B4-BE49-F238E27FC236}">
+                <a16:creationId xmlns:a16="http://schemas.microsoft.com/office/drawing/2014/main" id="{394085AC-9B66-EE47-A0D8-750E2075F903}"/>
+              </a:ext>
+            </a:extLst>
+          </p:cNvPr>
+          <p:cNvSpPr>
+            <a:spLocks noGrp="1"/>
+          </p:cNvSpPr>
+          <p:nvPr>
+            <p:ph idx="1"/>
+          </p:nvPr>
+        </p:nvSpPr>
+        <p:spPr/>
+        <p:txBody>
+          <a:bodyPr/>
+          <a:lstStyle/>
+          <a:p>
+            <a:pPr marL="0" indent="0">
+              <a:buNone/>
+            </a:pPr>
+            <a:r>
+              <a:rPr lang="en-US" dirty="0"/>
+              <a:t>Clone the `</a:t>
+            </a:r>
+            <a:r>
+              <a:rPr lang="en-US" dirty="0" err="1"/>
+              <a:t>restapi</a:t>
+            </a:r>
+            <a:r>
+              <a:rPr lang="en-US" dirty="0"/>
+              <a:t>` repository</a:t>
+            </a:r>
+          </a:p>
+          <a:p>
+            <a:pPr marL="0" indent="0">
+              <a:buNone/>
+            </a:pPr>
+            <a:r>
+              <a:rPr lang="en-US" dirty="0"/>
+              <a:t>Make sure you can build (docker and dotnet core 2.0)</a:t>
+            </a:r>
+          </a:p>
+          <a:p>
+            <a:pPr marL="0" indent="0">
+              <a:buNone/>
+            </a:pPr>
+            <a:r>
+              <a:rPr lang="en-US" dirty="0"/>
+              <a:t>Add support (state management, semantics, etc.) for:</a:t>
+            </a:r>
+          </a:p>
+          <a:p>
+            <a:pPr marL="457200" lvl="1" indent="0">
+              <a:buNone/>
+            </a:pPr>
+            <a:r>
+              <a:rPr lang="en-US" dirty="0"/>
+              <a:t>Remove (DELETE) a draft or cancelled timecard</a:t>
+            </a:r>
+          </a:p>
+          <a:p>
+            <a:pPr marL="457200" lvl="1" indent="0">
+              <a:buNone/>
+            </a:pPr>
+            <a:r>
+              <a:rPr lang="en-US" dirty="0"/>
+              <a:t>Replace (POST) a complete line item</a:t>
+            </a:r>
+          </a:p>
+          <a:p>
+            <a:pPr marL="457200" lvl="1" indent="0">
+              <a:buNone/>
+            </a:pPr>
+            <a:r>
+              <a:rPr lang="en-US" dirty="0"/>
+              <a:t>Update (PATCH) a line item</a:t>
+            </a:r>
+          </a:p>
+          <a:p>
+            <a:pPr marL="457200" lvl="1" indent="0">
+              <a:buNone/>
+            </a:pPr>
+            <a:r>
+              <a:rPr lang="en-US" dirty="0"/>
+              <a:t>Verify that timecard resource is consistent</a:t>
+            </a:r>
+          </a:p>
+          <a:p>
+            <a:pPr marL="457200" lvl="1" indent="0">
+              <a:buNone/>
+            </a:pPr>
+            <a:r>
+              <a:rPr lang="en-US" dirty="0"/>
+              <a:t>Verify that timecard approver is not timecard resource</a:t>
+            </a:r>
+          </a:p>
+        </p:txBody>
+      </p:sp>
+    </p:spTree>
+    <p:extLst>
+      <p:ext uri="{BB962C8B-B14F-4D97-AF65-F5344CB8AC3E}">
+        <p14:creationId xmlns:p14="http://schemas.microsoft.com/office/powerpoint/2010/main" val="3973889465"/>
       </p:ext>
     </p:extLst>
   </p:cSld>

</xml_diff>

<commit_message>
adding new root link
</commit_message>
<xml_diff>
--- a/01 - Introduction.pptx
+++ b/01 - Introduction.pptx
@@ -6451,7 +6451,11 @@
             </a:pPr>
             <a:r>
               <a:rPr lang="en-US" dirty="0"/>
-              <a:t>E-mail: millerm@seattleu.edu</a:t>
+              <a:t>E-mail: </a:t>
+            </a:r>
+            <a:r>
+              <a:rPr lang="en-US" u="sng" dirty="0"/>
+              <a:t>millerm@seattleu.edu</a:t>
             </a:r>
           </a:p>
           <a:p>
@@ -11905,7 +11909,7 @@
             </a:pPr>
             <a:r>
               <a:rPr lang="en-US" dirty="0"/>
-              <a:t>One team project</a:t>
+              <a:t>Randomly assigned homework</a:t>
             </a:r>
           </a:p>
           <a:p>
@@ -11914,7 +11918,7 @@
             </a:pPr>
             <a:r>
               <a:rPr lang="en-US" dirty="0"/>
-              <a:t>At least one, 15-30 minute, individual presentation</a:t>
+              <a:t>Some kind of team / group project</a:t>
             </a:r>
           </a:p>
           <a:p>
@@ -12446,7 +12450,7 @@
             </a:pPr>
             <a:r>
               <a:rPr lang="en-US" dirty="0"/>
-              <a:t>Design and architecture decision impacts on quality</a:t>
+              <a:t>Agile and / or software architecture</a:t>
             </a:r>
           </a:p>
           <a:p>

</xml_diff>

<commit_message>
posting final presentation from tuesday
</commit_message>
<xml_diff>
--- a/01 - Introduction.pptx
+++ b/01 - Introduction.pptx
@@ -12328,6 +12328,20 @@
               <a:rPr lang="en-US" dirty="0"/>
               <a:t>Verify that timecard approver is not timecard resource</a:t>
             </a:r>
+          </a:p>
+          <a:p>
+            <a:pPr marL="457200" lvl="1" indent="0">
+              <a:buNone/>
+            </a:pPr>
+            <a:r>
+              <a:rPr lang="en-US" dirty="0"/>
+              <a:t>Add support to root document for creating </a:t>
+            </a:r>
+            <a:r>
+              <a:rPr lang="en-US"/>
+              <a:t>a timesheet</a:t>
+            </a:r>
+            <a:endParaRPr lang="en-US" dirty="0"/>
           </a:p>
         </p:txBody>
       </p:sp>

</xml_diff>